<commit_message>
Grammar and Spelling Improvements
</commit_message>
<xml_diff>
--- a/Whiteboard design session/WDS trainer presentation - App modernization.pptx
+++ b/Whiteboard design session/WDS trainer presentation - App modernization.pptx
@@ -225,7 +225,7 @@
           <a:p>
             <a:fld id="{52A13B17-C506-4D51-BB37-16B365906619}" type="datetimeFigureOut">
               <a:rPr lang="en-US" smtClean="0"/>
-              <a:t>3/2/2021</a:t>
+              <a:t>2021-03-09</a:t>
             </a:fld>
             <a:endParaRPr lang="en-US" dirty="0"/>
           </a:p>
@@ -1375,7 +1375,7 @@
                 <a:effectLst/>
                 <a:latin typeface="Segoe UI" panose="020B0502040204020203" pitchFamily="34" charset="0"/>
               </a:rPr>
-              <a:t>, which analyzes one assembly per project, and as a </a:t>
+              <a:t>, which analyzes one assembly per project, and as an </a:t>
             </a:r>
             <a:r>
               <a:rPr lang="en-US" b="0" i="0" u="none" strike="noStrike" dirty="0">
@@ -1403,7 +1403,7 @@
                 <a:effectLst/>
                 <a:latin typeface="-apple-system"/>
               </a:rPr>
-              <a:t>Here you see a DGML file showing dependencies in Parts Unlimited web application.</a:t>
+              <a:t>Here you see a DGML file showing dependencies in the Parts Unlimited web application.</a:t>
             </a:r>
             <a:endParaRPr lang="en-US" dirty="0"/>
           </a:p>
@@ -1862,113 +1862,134 @@
           <a:bodyPr/>
           <a:lstStyle/>
           <a:p>
-            <a:r>
-              <a:rPr lang="en-US" sz="4800" b="0" dirty="0">
+            <a:pPr>
+              <a:spcBef>
+                <a:spcPts val="0"/>
+              </a:spcBef>
+              <a:spcAft>
+                <a:spcPts val="0"/>
+              </a:spcAft>
+            </a:pPr>
+            <a:r>
+              <a:rPr lang="en-US" sz="6600" dirty="0">
                 <a:solidFill>
-                  <a:srgbClr val="000000"/>
+                  <a:srgbClr val="0E101A"/>
                 </a:solidFill>
                 <a:effectLst/>
-                <a:latin typeface="Consolas" panose="020B0609020204030204" pitchFamily="49" charset="0"/>
               </a:rPr>
-              <a:t>- We have </a:t>
-            </a:r>
-            <a:r>
-              <a:rPr lang="en-US" sz="4800" b="0" dirty="0">
+              <a:t>- We have [The .NET Portability Analyzer](</a:t>
+            </a:r>
+            <a:r>
+              <a:rPr lang="en-US" sz="6600" u="sng" dirty="0">
                 <a:solidFill>
-                  <a:srgbClr val="A31515"/>
+                  <a:srgbClr val="0E101A"/>
                 </a:solidFill>
                 <a:effectLst/>
-                <a:latin typeface="Consolas" panose="020B0609020204030204" pitchFamily="49" charset="0"/>
               </a:rPr>
-              <a:t>[The .NET Portability Analyzer]</a:t>
-            </a:r>
-            <a:r>
-              <a:rPr lang="en-US" sz="4800" b="0" dirty="0">
+              <a:t>https://docs.microsoft.com/en-us/dotnet/standard/analyzers/portability-analyzer</a:t>
+            </a:r>
+            <a:r>
+              <a:rPr lang="en-US" sz="6600" dirty="0">
                 <a:solidFill>
-                  <a:srgbClr val="222222"/>
+                  <a:srgbClr val="0E101A"/>
                 </a:solidFill>
                 <a:effectLst/>
-                <a:latin typeface="Consolas" panose="020B0609020204030204" pitchFamily="49" charset="0"/>
               </a:rPr>
-              <a:t>(</a:t>
-            </a:r>
-            <a:r>
-              <a:rPr lang="en-US" sz="4800" b="0" u="sng" dirty="0">
+              <a:t>) that can be used to assess how much work is required for a migration. We know projects that can migrate with a single configuration change and others who had to do some work based on the application's complexity and code dependencies. The .NET Portability Analyzer can give you a good idea of how much effort is required to migrate to a newer version, including an assessment of all your code dependencies. </a:t>
+            </a:r>
+          </a:p>
+          <a:p>
+            <a:pPr>
+              <a:spcBef>
+                <a:spcPts val="0"/>
+              </a:spcBef>
+              <a:spcAft>
+                <a:spcPts val="0"/>
+              </a:spcAft>
+            </a:pPr>
+            <a:r>
+              <a:rPr lang="en-US" sz="6600" dirty="0">
                 <a:solidFill>
-                  <a:srgbClr val="000000"/>
+                  <a:srgbClr val="0E101A"/>
                 </a:solidFill>
                 <a:effectLst/>
-                <a:latin typeface="Consolas" panose="020B0609020204030204" pitchFamily="49" charset="0"/>
               </a:rPr>
-              <a:t>https://docs.microsoft.com/en-us/dotnet/standard/analyzers/portability-analyzer</a:t>
-            </a:r>
-            <a:r>
-              <a:rPr lang="en-US" sz="4800" b="0" dirty="0">
+              <a:t>- When a .NET Core version is </a:t>
+            </a:r>
+            <a:r>
+              <a:rPr lang="en-US" sz="6600" dirty="0" err="1">
                 <a:solidFill>
-                  <a:srgbClr val="222222"/>
+                  <a:srgbClr val="0E101A"/>
                 </a:solidFill>
                 <a:effectLst/>
-                <a:latin typeface="Consolas" panose="020B0609020204030204" pitchFamily="49" charset="0"/>
               </a:rPr>
-              <a:t>)</a:t>
-            </a:r>
-            <a:r>
-              <a:rPr lang="en-US" sz="4800" b="0" dirty="0">
+              <a:t>EoL</a:t>
+            </a:r>
+            <a:r>
+              <a:rPr lang="en-US" sz="6600" dirty="0">
                 <a:solidFill>
-                  <a:srgbClr val="000000"/>
+                  <a:srgbClr val="0E101A"/>
                 </a:solidFill>
                 <a:effectLst/>
-                <a:latin typeface="Consolas" panose="020B0609020204030204" pitchFamily="49" charset="0"/>
               </a:rPr>
-              <a:t> that can be used to assess how much work is required for a migration. We know projects that can migrate with a single configuration change and others who had to do some work based on the application's complexity and code dependencies. The .NET Portability Analyzer can give you a good idea of how much effort is required to migrate to a newer version including an assessment of all your code dependencies. </a:t>
-            </a:r>
-          </a:p>
-          <a:p>
-            <a:r>
-              <a:rPr lang="en-US" sz="4800" b="0" dirty="0">
+              <a:t> (End-of-Life), does that mean we cannot host our solution in Azure?</a:t>
+            </a:r>
+          </a:p>
+          <a:p>
+            <a:pPr>
+              <a:spcBef>
+                <a:spcPts val="0"/>
+              </a:spcBef>
+              <a:spcAft>
+                <a:spcPts val="0"/>
+              </a:spcAft>
+            </a:pPr>
+            <a:r>
+              <a:rPr lang="en-US" sz="6600" dirty="0">
                 <a:solidFill>
-                  <a:srgbClr val="000000"/>
+                  <a:srgbClr val="0E101A"/>
                 </a:solidFill>
                 <a:effectLst/>
-                <a:latin typeface="Consolas" panose="020B0609020204030204" pitchFamily="49" charset="0"/>
               </a:rPr>
-              <a:t>- When a .NET Core version is EoL (End-of-Life), does that mean we cannot host our solution in Azure?</a:t>
-            </a:r>
-          </a:p>
-          <a:p>
-            <a:r>
-              <a:rPr lang="en-US" sz="4800" b="0" dirty="0">
+              <a:t>- After the End-Of-Lime time, .NET Core patch updates will no longer be available for .NET Core 2.2. Your application will still run. .NET Core 2.2 was released as a non-LTS (Long Term Support) release. A non-LTS ("Current") release is supported for three months after the next release. For hosting applications that you do not intend to update often, we suggest LTS releases. LTS releases include features and components that have been stabilized, requiring few updates over a longer support release lifetime. The supported upgrade path from .NET Core 2.2 is via .NET Core 3.1. .NET Core 3.1 is released December 3, 2019, as a long-term support release. </a:t>
+            </a:r>
+          </a:p>
+          <a:p>
+            <a:pPr>
+              <a:spcBef>
+                <a:spcPts val="0"/>
+              </a:spcBef>
+              <a:spcAft>
+                <a:spcPts val="0"/>
+              </a:spcAft>
+            </a:pPr>
+            <a:r>
+              <a:rPr lang="en-US" sz="6600" dirty="0">
                 <a:solidFill>
-                  <a:srgbClr val="000000"/>
+                  <a:srgbClr val="0E101A"/>
                 </a:solidFill>
                 <a:effectLst/>
-                <a:latin typeface="Consolas" panose="020B0609020204030204" pitchFamily="49" charset="0"/>
               </a:rPr>
-              <a:t>- After the End-Of-Lime time, .NET Core patch updates will no longer be available for .NET Core 2.2. Your application will still run. .NET Core 2.2 was released as a non-LTS (Long Term Support) release. A non-LTS ("Current") release is supported for three months after the next release. For hosting applications that you do not intend to update often, we suggest LTS releases. LTS releases include features and components that have been stabilized, requiring few updates over a longer support release lifetime. The supported upgrade path from .NET Core 2.2 is via .NET Core 3.1. .NET Core 3.1 is released December 3, 2019, as a long-term support release. </a:t>
-            </a:r>
-          </a:p>
-          <a:p>
-            <a:r>
-              <a:rPr lang="en-US" sz="4800" b="0" dirty="0">
+              <a:t>- Azure is an open cloud that offers multiple choices. We suggest App Service if you have a single or a few back-end services in an N-Tier architecture. Azure Kubernetes Services is a better fit for Cloud-Native (Microservices) design.</a:t>
+            </a:r>
+          </a:p>
+          <a:p>
+            <a:pPr>
+              <a:spcBef>
+                <a:spcPts val="0"/>
+              </a:spcBef>
+              <a:spcAft>
+                <a:spcPts val="0"/>
+              </a:spcAft>
+            </a:pPr>
+            <a:r>
+              <a:rPr lang="en-US" sz="6600" dirty="0">
                 <a:solidFill>
-                  <a:srgbClr val="000000"/>
+                  <a:srgbClr val="0E101A"/>
                 </a:solidFill>
                 <a:effectLst/>
-                <a:latin typeface="Consolas" panose="020B0609020204030204" pitchFamily="49" charset="0"/>
               </a:rPr>
-              <a:t>- Azure is an open cloud that offers multiple choices. We suggest App Service if you have a single or a few back-end services in an N-Tier architecture. Azure Kubernetes Services is a better fit for Cloud-Native (Microservices) design.</a:t>
-            </a:r>
-          </a:p>
-          <a:p>
-            <a:r>
-              <a:rPr lang="en-US" sz="4800" b="0" dirty="0">
-                <a:solidFill>
-                  <a:srgbClr val="000000"/>
-                </a:solidFill>
-                <a:effectLst/>
-                <a:latin typeface="Consolas" panose="020B0609020204030204" pitchFamily="49" charset="0"/>
-              </a:rPr>
-              <a:t>- Azure has 60+ regions, more than any other cloud provider. Our physical infrastructure comprises 160+ physical datacenters arranged into regions and linked by one of the world's largest interconnected networks. We have services such as Azure Traffic Manager for DNS-based traffic load balancing, Azure Front Door, a global, scalable entry-point that uses the Microsoft global edge network to create fast, secure, and widely scalable web applications, and Azure CosmosDB, a globally-distributed planet-scale database service. All these services are ready for implementation and used by millions of customers every day. We would be more than happy to help Parts Unlimited scale its operations globally.</a:t>
+              <a:t>- Azure has 60+ regions, more than any other cloud provider. Our physical infrastructure comprises 160+ physical datacenters arranged into regions and linked by one of the world's largest interconnected networks. We have services such as Azure Traffic Manager for DNS-based traffic load balancing, Azure Front Door, a global, scalable entry-point that uses the Microsoft global edge network to create fast, secure, and widely scalable web applications, and Azure CosmosDB, a globally-distributed planet-scale database service. All these services are ready for implementation and used by millions of customers every day. We would be more than happy to help Parts Unlimited scale its operations globally.</a:t>
             </a:r>
           </a:p>
         </p:txBody>
@@ -2344,7 +2365,7 @@
                   <a:prstClr val="black"/>
                 </a:solidFill>
               </a:rPr>
-              <a:t>3/2/2021 9:10 AM</a:t>
+              <a:t>2021-03-09 1:48 PM</a:t>
             </a:fld>
             <a:endParaRPr lang="en-US" dirty="0">
               <a:solidFill>
@@ -17770,237 +17791,6 @@
           </a:p>
         </p:txBody>
       </p:sp>
-      <p:pic>
-        <p:nvPicPr>
-          <p:cNvPr id="5" name="Picture 4" descr="Contoso Insurance logo" title="Contoso Insurance logo">
-            <a:extLst>
-              <a:ext uri="{FF2B5EF4-FFF2-40B4-BE49-F238E27FC236}">
-                <a16:creationId xmlns:a16="http://schemas.microsoft.com/office/drawing/2014/main" id="{EC3AF1FC-904F-45B4-B889-E582F43AF574}"/>
-              </a:ext>
-            </a:extLst>
-          </p:cNvPr>
-          <p:cNvPicPr>
-            <a:picLocks noChangeAspect="1"/>
-          </p:cNvPicPr>
-          <p:nvPr/>
-        </p:nvPicPr>
-        <p:blipFill>
-          <a:blip r:embed="rId3">
-            <a:extLst>
-              <a:ext uri="{28A0092B-C50C-407E-A947-70E740481C1C}">
-                <a14:useLocalDpi xmlns:a14="http://schemas.microsoft.com/office/drawing/2010/main" val="0"/>
-              </a:ext>
-            </a:extLst>
-          </a:blip>
-          <a:stretch>
-            <a:fillRect/>
-          </a:stretch>
-        </p:blipFill>
-        <p:spPr>
-          <a:xfrm>
-            <a:off x="10193514" y="289511"/>
-            <a:ext cx="1524000" cy="1524000"/>
-          </a:xfrm>
-          <a:prstGeom prst="rect">
-            <a:avLst/>
-          </a:prstGeom>
-        </p:spPr>
-      </p:pic>
-      <p:pic>
-        <p:nvPicPr>
-          <p:cNvPr id="13" name="Graphic 12" descr="Mobile device icon">
-            <a:extLst>
-              <a:ext uri="{FF2B5EF4-FFF2-40B4-BE49-F238E27FC236}">
-                <a16:creationId xmlns:a16="http://schemas.microsoft.com/office/drawing/2014/main" id="{31B50B0C-C074-4091-B6D7-15CEE888267D}"/>
-              </a:ext>
-            </a:extLst>
-          </p:cNvPr>
-          <p:cNvPicPr>
-            <a:picLocks noChangeAspect="1"/>
-          </p:cNvPicPr>
-          <p:nvPr/>
-        </p:nvPicPr>
-        <p:blipFill>
-          <a:blip r:embed="rId4" cstate="print">
-            <a:extLst>
-              <a:ext uri="{28A0092B-C50C-407E-A947-70E740481C1C}">
-                <a14:useLocalDpi xmlns:a14="http://schemas.microsoft.com/office/drawing/2010/main" val="0"/>
-              </a:ext>
-              <a:ext uri="{96DAC541-7B7A-43D3-8B79-37D633B846F1}">
-                <asvg:svgBlip xmlns:asvg="http://schemas.microsoft.com/office/drawing/2016/SVG/main" r:embed="rId5"/>
-              </a:ext>
-            </a:extLst>
-          </a:blip>
-          <a:stretch>
-            <a:fillRect/>
-          </a:stretch>
-        </p:blipFill>
-        <p:spPr>
-          <a:xfrm>
-            <a:off x="9971096" y="2308845"/>
-            <a:ext cx="914400" cy="914400"/>
-          </a:xfrm>
-          <a:prstGeom prst="rect">
-            <a:avLst/>
-          </a:prstGeom>
-        </p:spPr>
-      </p:pic>
-      <p:pic>
-        <p:nvPicPr>
-          <p:cNvPr id="9" name="Graphic 8" descr="Tools icon">
-            <a:extLst>
-              <a:ext uri="{FF2B5EF4-FFF2-40B4-BE49-F238E27FC236}">
-                <a16:creationId xmlns:a16="http://schemas.microsoft.com/office/drawing/2014/main" id="{89FEF95B-601C-4168-8437-381D7F5D664F}"/>
-              </a:ext>
-            </a:extLst>
-          </p:cNvPr>
-          <p:cNvPicPr>
-            <a:picLocks noChangeAspect="1"/>
-          </p:cNvPicPr>
-          <p:nvPr/>
-        </p:nvPicPr>
-        <p:blipFill>
-          <a:blip r:embed="rId6" cstate="print">
-            <a:extLst>
-              <a:ext uri="{28A0092B-C50C-407E-A947-70E740481C1C}">
-                <a14:useLocalDpi xmlns:a14="http://schemas.microsoft.com/office/drawing/2010/main" val="0"/>
-              </a:ext>
-              <a:ext uri="{96DAC541-7B7A-43D3-8B79-37D633B846F1}">
-                <asvg:svgBlip xmlns:asvg="http://schemas.microsoft.com/office/drawing/2016/SVG/main" r:embed="rId7"/>
-              </a:ext>
-            </a:extLst>
-          </a:blip>
-          <a:stretch>
-            <a:fillRect/>
-          </a:stretch>
-        </p:blipFill>
-        <p:spPr>
-          <a:xfrm>
-            <a:off x="10948088" y="2308845"/>
-            <a:ext cx="914400" cy="914400"/>
-          </a:xfrm>
-          <a:prstGeom prst="rect">
-            <a:avLst/>
-          </a:prstGeom>
-        </p:spPr>
-      </p:pic>
-      <p:pic>
-        <p:nvPicPr>
-          <p:cNvPr id="7" name="Graphic 6" descr="Key icon">
-            <a:extLst>
-              <a:ext uri="{FF2B5EF4-FFF2-40B4-BE49-F238E27FC236}">
-                <a16:creationId xmlns:a16="http://schemas.microsoft.com/office/drawing/2014/main" id="{5438B829-CEFC-413B-B15B-DDA2452C80C7}"/>
-              </a:ext>
-            </a:extLst>
-          </p:cNvPr>
-          <p:cNvPicPr>
-            <a:picLocks noChangeAspect="1"/>
-          </p:cNvPicPr>
-          <p:nvPr/>
-        </p:nvPicPr>
-        <p:blipFill>
-          <a:blip r:embed="rId8" cstate="print">
-            <a:extLst>
-              <a:ext uri="{28A0092B-C50C-407E-A947-70E740481C1C}">
-                <a14:useLocalDpi xmlns:a14="http://schemas.microsoft.com/office/drawing/2010/main" val="0"/>
-              </a:ext>
-              <a:ext uri="{96DAC541-7B7A-43D3-8B79-37D633B846F1}">
-                <asvg:svgBlip xmlns:asvg="http://schemas.microsoft.com/office/drawing/2016/SVG/main" r:embed="rId9"/>
-              </a:ext>
-            </a:extLst>
-          </a:blip>
-          <a:stretch>
-            <a:fillRect/>
-          </a:stretch>
-        </p:blipFill>
-        <p:spPr>
-          <a:xfrm>
-            <a:off x="10490888" y="3471579"/>
-            <a:ext cx="914400" cy="914400"/>
-          </a:xfrm>
-          <a:prstGeom prst="rect">
-            <a:avLst/>
-          </a:prstGeom>
-        </p:spPr>
-      </p:pic>
-      <p:pic>
-        <p:nvPicPr>
-          <p:cNvPr id="11" name="Graphic 10" descr="Search icon">
-            <a:extLst>
-              <a:ext uri="{FF2B5EF4-FFF2-40B4-BE49-F238E27FC236}">
-                <a16:creationId xmlns:a16="http://schemas.microsoft.com/office/drawing/2014/main" id="{7AAEC09D-AC5D-4276-B73B-F792901F31AE}"/>
-              </a:ext>
-            </a:extLst>
-          </p:cNvPr>
-          <p:cNvPicPr>
-            <a:picLocks noChangeAspect="1"/>
-          </p:cNvPicPr>
-          <p:nvPr/>
-        </p:nvPicPr>
-        <p:blipFill>
-          <a:blip r:embed="rId10" cstate="print">
-            <a:extLst>
-              <a:ext uri="{28A0092B-C50C-407E-A947-70E740481C1C}">
-                <a14:useLocalDpi xmlns:a14="http://schemas.microsoft.com/office/drawing/2010/main" val="0"/>
-              </a:ext>
-              <a:ext uri="{96DAC541-7B7A-43D3-8B79-37D633B846F1}">
-                <asvg:svgBlip xmlns:asvg="http://schemas.microsoft.com/office/drawing/2016/SVG/main" r:embed="rId11"/>
-              </a:ext>
-            </a:extLst>
-          </a:blip>
-          <a:stretch>
-            <a:fillRect/>
-          </a:stretch>
-        </p:blipFill>
-        <p:spPr>
-          <a:xfrm>
-            <a:off x="10525911" y="4342914"/>
-            <a:ext cx="914400" cy="914400"/>
-          </a:xfrm>
-          <a:prstGeom prst="rect">
-            <a:avLst/>
-          </a:prstGeom>
-        </p:spPr>
-      </p:pic>
-      <p:pic>
-        <p:nvPicPr>
-          <p:cNvPr id="15" name="Graphic 14" descr="Database icon">
-            <a:extLst>
-              <a:ext uri="{FF2B5EF4-FFF2-40B4-BE49-F238E27FC236}">
-                <a16:creationId xmlns:a16="http://schemas.microsoft.com/office/drawing/2014/main" id="{6A79573E-C9C2-4F4F-9748-2E1239AAB63C}"/>
-              </a:ext>
-            </a:extLst>
-          </p:cNvPr>
-          <p:cNvPicPr>
-            <a:picLocks noChangeAspect="1"/>
-          </p:cNvPicPr>
-          <p:nvPr/>
-        </p:nvPicPr>
-        <p:blipFill>
-          <a:blip r:embed="rId12" cstate="print">
-            <a:extLst>
-              <a:ext uri="{28A0092B-C50C-407E-A947-70E740481C1C}">
-                <a14:useLocalDpi xmlns:a14="http://schemas.microsoft.com/office/drawing/2010/main" val="0"/>
-              </a:ext>
-              <a:ext uri="{96DAC541-7B7A-43D3-8B79-37D633B846F1}">
-                <asvg:svgBlip xmlns:asvg="http://schemas.microsoft.com/office/drawing/2016/SVG/main" r:embed="rId13"/>
-              </a:ext>
-            </a:extLst>
-          </a:blip>
-          <a:stretch>
-            <a:fillRect/>
-          </a:stretch>
-        </p:blipFill>
-        <p:spPr>
-          <a:xfrm>
-            <a:off x="10525911" y="5271941"/>
-            <a:ext cx="914400" cy="914400"/>
-          </a:xfrm>
-          <a:prstGeom prst="rect">
-            <a:avLst/>
-          </a:prstGeom>
-        </p:spPr>
-      </p:pic>
     </p:spTree>
     <p:extLst>
       <p:ext uri="{BB962C8B-B14F-4D97-AF65-F5344CB8AC3E}">

</xml_diff>

<commit_message>
Updated the lab narrative.
</commit_message>
<xml_diff>
--- a/Whiteboard design session/WDS trainer presentation - App modernization.pptx
+++ b/Whiteboard design session/WDS trainer presentation - App modernization.pptx
@@ -225,7 +225,7 @@
           <a:p>
             <a:fld id="{52A13B17-C506-4D51-BB37-16B365906619}" type="datetimeFigureOut">
               <a:rPr lang="en-US" smtClean="0"/>
-              <a:t>2021-03-09</a:t>
+              <a:t>10/5/2021</a:t>
             </a:fld>
             <a:endParaRPr lang="en-US" dirty="0"/>
           </a:p>
@@ -2365,7 +2365,7 @@
                   <a:prstClr val="black"/>
                 </a:solidFill>
               </a:rPr>
-              <a:t>2021-03-09 1:48 PM</a:t>
+              <a:t>10/5/2021 9:33 AM</a:t>
             </a:fld>
             <a:endParaRPr lang="en-US" dirty="0">
               <a:solidFill>
@@ -17965,7 +17965,7 @@
       </p:sp>
       <p:pic>
         <p:nvPicPr>
-          <p:cNvPr id="5" name="Graphic 4" descr="Customer objections icon">
+          <p:cNvPr id="5" name="Graphic 4" descr="Customer objections icon.  Question mark.">
             <a:extLst>
               <a:ext uri="{FF2B5EF4-FFF2-40B4-BE49-F238E27FC236}">
                 <a16:creationId xmlns:a16="http://schemas.microsoft.com/office/drawing/2014/main" id="{65F19434-6D82-4CAD-8B2D-6213DE94FB81}"/>

</xml_diff>